<commit_message>
changes to report 6:
</commit_message>
<xml_diff>
--- a/navigation/jibebe_week_six_progress.pptx
+++ b/navigation/jibebe_week_six_progress.pptx
@@ -1,6 +1,6 @@
 
 <file path=ppt/presentation.xml><?xml version="1.0" encoding="utf-8"?>
-<p:presentation xmlns:a="http://schemas.openxmlformats.org/drawingml/2006/main" xmlns:r="http://schemas.openxmlformats.org/officeDocument/2006/relationships" xmlns:p="http://schemas.openxmlformats.org/presentationml/2006/main">
+<p:presentation xmlns:a="http://schemas.openxmlformats.org/drawingml/2006/main" xmlns:r="http://schemas.openxmlformats.org/officeDocument/2006/relationships" xmlns:p="http://schemas.openxmlformats.org/presentationml/2006/main" xmlns:m="http://schemas.openxmlformats.org/officeDocument/2006/math" xmlns:w="http://schemas.openxmlformats.org/wordprocessingml/2006/main">
   <p:sldMasterIdLst>
     <p:sldMasterId id="2147483648" r:id="rId1"/>
   </p:sldMasterIdLst>
@@ -9,12 +9,12 @@
     <p:sldId id="257" r:id="rId4"/>
     <p:sldId id="258" r:id="rId5"/>
     <p:sldId id="259" r:id="rId6"/>
-    <p:sldId id="264" r:id="rId7"/>
-    <p:sldId id="265" r:id="rId8"/>
-    <p:sldId id="260" r:id="rId9"/>
-    <p:sldId id="261" r:id="rId10"/>
-    <p:sldId id="262" r:id="rId11"/>
-    <p:sldId id="263" r:id="rId12"/>
+    <p:sldId id="260" r:id="rId7"/>
+    <p:sldId id="261" r:id="rId8"/>
+    <p:sldId id="262" r:id="rId9"/>
+    <p:sldId id="263" r:id="rId10"/>
+    <p:sldId id="264" r:id="rId11"/>
+    <p:sldId id="265" r:id="rId12"/>
   </p:sldIdLst>
   <p:sldSz cx="12192000" cy="6858000"/>
   <p:notesSz cx="12192000" cy="6858000"/>
@@ -117,7 +117,7 @@
 </file>
 
 <file path=ppt/slideLayouts/slideLayout1.xml><?xml version="1.0" encoding="utf-8"?>
-<p:sldLayout xmlns:a="http://schemas.openxmlformats.org/drawingml/2006/main" xmlns:r="http://schemas.openxmlformats.org/officeDocument/2006/relationships" xmlns:p="http://schemas.openxmlformats.org/presentationml/2006/main" type="title" preserve="1" showMasterPhAnim="0" showMasterSp="0" userDrawn="1">
+<p:sldLayout xmlns:a="http://schemas.openxmlformats.org/drawingml/2006/main" xmlns:r="http://schemas.openxmlformats.org/officeDocument/2006/relationships" xmlns:p="http://schemas.openxmlformats.org/presentationml/2006/main" xmlns:m="http://schemas.openxmlformats.org/officeDocument/2006/math" xmlns:w="http://schemas.openxmlformats.org/wordprocessingml/2006/main" matchingName="" preserve="1" showMasterPhAnim="0" showMasterSp="0" type="title" userDrawn="1">
   <p:cSld name="Title Slide">
     <p:spTree>
       <p:nvGrpSpPr>
@@ -177,9 +177,7 @@
                   </a:schemeClr>
                 </a:duotone>
               </a:blip>
-              <a:stretch>
-                <a:fillRect/>
-              </a:stretch>
+              <a:stretch/>
             </a:blipFill>
             <a:ln>
               <a:noFill/>
@@ -222,7 +220,7 @@
               <a:cxnLst/>
               <a:rect l="0" t="0" r="r" b="b"/>
               <a:pathLst>
-                <a:path w="15356" h="8638" extrusionOk="0">
+                <a:path w="15356" h="8638" fill="norm" stroke="1" extrusionOk="0">
                   <a:moveTo>
                     <a:pt x="0" y="0"/>
                   </a:moveTo>
@@ -460,6 +458,7 @@
             </a:pPr>
             <a:fld id="{BA38155F-AEC7-4C83-BD8B-86231E183429}" type="datetimeFigureOut">
               <a:rPr lang="en-US"/>
+              <a:t/>
             </a:fld>
             <a:endParaRPr lang="en-US"/>
           </a:p>
@@ -563,6 +562,7 @@
             </a:pPr>
             <a:fld id="{00E55A38-CD7B-4575-ADB2-599742FE9C88}" type="slidenum">
               <a:rPr lang="en-US"/>
+              <a:t/>
             </a:fld>
             <a:endParaRPr lang="en-US"/>
           </a:p>
@@ -577,7 +577,7 @@
 </file>
 
 <file path=ppt/slideLayouts/slideLayout10.xml><?xml version="1.0" encoding="utf-8"?>
-<p:sldLayout xmlns:a="http://schemas.openxmlformats.org/drawingml/2006/main" xmlns:r="http://schemas.openxmlformats.org/officeDocument/2006/relationships" xmlns:p="http://schemas.openxmlformats.org/presentationml/2006/main" preserve="1" showMasterPhAnim="0" userDrawn="1">
+<p:sldLayout xmlns:a="http://schemas.openxmlformats.org/drawingml/2006/main" xmlns:r="http://schemas.openxmlformats.org/officeDocument/2006/relationships" xmlns:p="http://schemas.openxmlformats.org/presentationml/2006/main" xmlns:m="http://schemas.openxmlformats.org/officeDocument/2006/math" xmlns:w="http://schemas.openxmlformats.org/wordprocessingml/2006/main" matchingName="" preserve="1" showMasterPhAnim="0" userDrawn="1">
   <p:cSld name="Panoramic Picture with Caption">
     <p:spTree>
       <p:nvGrpSpPr>
@@ -637,9 +637,7 @@
                   </a:schemeClr>
                 </a:duotone>
               </a:blip>
-              <a:stretch>
-                <a:fillRect/>
-              </a:stretch>
+              <a:stretch/>
             </a:blipFill>
             <a:ln>
               <a:noFill/>
@@ -950,7 +948,7 @@
               <a:cxnLst/>
               <a:rect l="l" t="t" r="r" b="b"/>
               <a:pathLst>
-                <a:path w="10000" h="5291" extrusionOk="0">
+                <a:path w="10000" h="5291" fill="norm" stroke="1" extrusionOk="0">
                   <a:moveTo>
                     <a:pt x="85" y="2532"/>
                   </a:moveTo>
@@ -1097,7 +1095,7 @@
               <a:cxnLst/>
               <a:rect l="0" t="0" r="r" b="b"/>
               <a:pathLst>
-                <a:path w="7104" h="2856" extrusionOk="0">
+                <a:path w="7104" h="2856" fill="norm" stroke="1" extrusionOk="0">
                   <a:moveTo>
                     <a:pt x="0" y="0"/>
                   </a:moveTo>
@@ -1283,7 +1281,7 @@
               <a:cxnLst/>
               <a:rect l="0" t="0" r="r" b="b"/>
               <a:pathLst>
-                <a:path w="15356" h="8638" extrusionOk="0">
+                <a:path w="15356" h="8638" fill="norm" stroke="1" extrusionOk="0">
                   <a:moveTo>
                     <a:pt x="0" y="0"/>
                   </a:moveTo>
@@ -1369,7 +1367,7 @@
         <p:nvSpPr>
           <p:cNvPr id="3" name="Picture Placeholder 2"/>
           <p:cNvSpPr>
-            <a:spLocks noGrp="1" noChangeAspect="1"/>
+            <a:spLocks noChangeAspect="1" noGrp="1"/>
           </p:cNvSpPr>
           <p:nvPr>
             <p:ph type="pic" idx="1"/>
@@ -1544,6 +1542,7 @@
             </a:pPr>
             <a:fld id="{BA38155F-AEC7-4C83-BD8B-86231E183429}" type="datetimeFigureOut">
               <a:rPr lang="en-US"/>
+              <a:t/>
             </a:fld>
             <a:endParaRPr lang="en-US"/>
           </a:p>
@@ -1627,6 +1626,7 @@
             </a:pPr>
             <a:fld id="{00E55A38-CD7B-4575-ADB2-599742FE9C88}" type="slidenum">
               <a:rPr lang="en-US"/>
+              <a:t/>
             </a:fld>
             <a:endParaRPr lang="en-US"/>
           </a:p>
@@ -1641,7 +1641,7 @@
 </file>
 
 <file path=ppt/slideLayouts/slideLayout11.xml><?xml version="1.0" encoding="utf-8"?>
-<p:sldLayout xmlns:a="http://schemas.openxmlformats.org/drawingml/2006/main" xmlns:r="http://schemas.openxmlformats.org/officeDocument/2006/relationships" xmlns:p="http://schemas.openxmlformats.org/presentationml/2006/main" preserve="1" showMasterPhAnim="0" showMasterSp="0" userDrawn="1">
+<p:sldLayout xmlns:a="http://schemas.openxmlformats.org/drawingml/2006/main" xmlns:r="http://schemas.openxmlformats.org/officeDocument/2006/relationships" xmlns:p="http://schemas.openxmlformats.org/presentationml/2006/main" xmlns:m="http://schemas.openxmlformats.org/officeDocument/2006/math" xmlns:w="http://schemas.openxmlformats.org/wordprocessingml/2006/main" matchingName="" preserve="1" showMasterPhAnim="0" showMasterSp="0" userDrawn="1">
   <p:cSld name="Title and Caption">
     <p:spTree>
       <p:nvGrpSpPr>
@@ -1701,9 +1701,7 @@
                   </a:schemeClr>
                 </a:duotone>
               </a:blip>
-              <a:stretch>
-                <a:fillRect/>
-              </a:stretch>
+              <a:stretch/>
             </a:blipFill>
             <a:ln>
               <a:noFill/>
@@ -2014,7 +2012,7 @@
               <a:cxnLst/>
               <a:rect l="l" t="t" r="r" b="b"/>
               <a:pathLst>
-                <a:path w="10000" h="5291" extrusionOk="0">
+                <a:path w="10000" h="5291" fill="norm" stroke="1" extrusionOk="0">
                   <a:moveTo>
                     <a:pt x="85" y="2532"/>
                   </a:moveTo>
@@ -2161,7 +2159,7 @@
               <a:cxnLst/>
               <a:rect l="l" t="t" r="r" b="b"/>
               <a:pathLst>
-                <a:path w="10000" h="7946" extrusionOk="0">
+                <a:path w="10000" h="7946" fill="norm" stroke="1" extrusionOk="0">
                   <a:moveTo>
                     <a:pt x="0" y="0"/>
                   </a:moveTo>
@@ -2347,7 +2345,7 @@
               <a:cxnLst/>
               <a:rect l="0" t="0" r="r" b="b"/>
               <a:pathLst>
-                <a:path w="15356" h="8638" extrusionOk="0">
+                <a:path w="15356" h="8638" fill="norm" stroke="1" extrusionOk="0">
                   <a:moveTo>
                     <a:pt x="0" y="0"/>
                   </a:moveTo>
@@ -2517,6 +2515,7 @@
             </a:pPr>
             <a:fld id="{BA38155F-AEC7-4C83-BD8B-86231E183429}" type="datetimeFigureOut">
               <a:rPr lang="en-US"/>
+              <a:t/>
             </a:fld>
             <a:endParaRPr lang="en-US"/>
           </a:p>
@@ -2600,6 +2599,7 @@
             </a:pPr>
             <a:fld id="{00E55A38-CD7B-4575-ADB2-599742FE9C88}" type="slidenum">
               <a:rPr lang="en-US"/>
+              <a:t/>
             </a:fld>
             <a:endParaRPr lang="en-US"/>
           </a:p>
@@ -2614,7 +2614,7 @@
 </file>
 
 <file path=ppt/slideLayouts/slideLayout12.xml><?xml version="1.0" encoding="utf-8"?>
-<p:sldLayout xmlns:a="http://schemas.openxmlformats.org/drawingml/2006/main" xmlns:r="http://schemas.openxmlformats.org/officeDocument/2006/relationships" xmlns:p="http://schemas.openxmlformats.org/presentationml/2006/main" preserve="1" showMasterPhAnim="0" showMasterSp="0" userDrawn="1">
+<p:sldLayout xmlns:a="http://schemas.openxmlformats.org/drawingml/2006/main" xmlns:r="http://schemas.openxmlformats.org/officeDocument/2006/relationships" xmlns:p="http://schemas.openxmlformats.org/presentationml/2006/main" xmlns:m="http://schemas.openxmlformats.org/officeDocument/2006/math" xmlns:w="http://schemas.openxmlformats.org/wordprocessingml/2006/main" matchingName="" preserve="1" showMasterPhAnim="0" showMasterSp="0" userDrawn="1">
   <p:cSld name="Quote with Caption">
     <p:spTree>
       <p:nvGrpSpPr>
@@ -2674,9 +2674,7 @@
                   </a:schemeClr>
                 </a:duotone>
               </a:blip>
-              <a:stretch>
-                <a:fillRect/>
-              </a:stretch>
+              <a:stretch/>
             </a:blipFill>
             <a:ln>
               <a:noFill/>
@@ -2987,7 +2985,7 @@
               <a:cxnLst/>
               <a:rect l="l" t="t" r="r" b="b"/>
               <a:pathLst>
-                <a:path w="10000" h="5291" extrusionOk="0">
+                <a:path w="10000" h="5291" fill="norm" stroke="1" extrusionOk="0">
                   <a:moveTo>
                     <a:pt x="85" y="2532"/>
                   </a:moveTo>
@@ -3134,7 +3132,7 @@
               <a:cxnLst/>
               <a:rect l="l" t="t" r="r" b="b"/>
               <a:pathLst>
-                <a:path w="10000" h="8000" extrusionOk="0">
+                <a:path w="10000" h="8000" fill="norm" stroke="1" extrusionOk="0">
                   <a:moveTo>
                     <a:pt x="0" y="0"/>
                   </a:moveTo>
@@ -3320,7 +3318,7 @@
               <a:cxnLst/>
               <a:rect l="0" t="0" r="r" b="b"/>
               <a:pathLst>
-                <a:path w="15356" h="8638" extrusionOk="0">
+                <a:path w="15356" h="8638" fill="norm" stroke="1" extrusionOk="0">
                   <a:moveTo>
                     <a:pt x="0" y="0"/>
                   </a:moveTo>
@@ -3671,6 +3669,7 @@
             </a:pPr>
             <a:fld id="{BA38155F-AEC7-4C83-BD8B-86231E183429}" type="datetimeFigureOut">
               <a:rPr lang="en-US"/>
+              <a:t/>
             </a:fld>
             <a:endParaRPr lang="en-US"/>
           </a:p>
@@ -3754,6 +3753,7 @@
             </a:pPr>
             <a:fld id="{00E55A38-CD7B-4575-ADB2-599742FE9C88}" type="slidenum">
               <a:rPr lang="en-US"/>
+              <a:t/>
             </a:fld>
             <a:endParaRPr lang="en-US"/>
           </a:p>
@@ -3768,7 +3768,7 @@
 </file>
 
 <file path=ppt/slideLayouts/slideLayout13.xml><?xml version="1.0" encoding="utf-8"?>
-<p:sldLayout xmlns:a="http://schemas.openxmlformats.org/drawingml/2006/main" xmlns:r="http://schemas.openxmlformats.org/officeDocument/2006/relationships" xmlns:p="http://schemas.openxmlformats.org/presentationml/2006/main" preserve="1" showMasterPhAnim="0" showMasterSp="0" userDrawn="1">
+<p:sldLayout xmlns:a="http://schemas.openxmlformats.org/drawingml/2006/main" xmlns:r="http://schemas.openxmlformats.org/officeDocument/2006/relationships" xmlns:p="http://schemas.openxmlformats.org/presentationml/2006/main" xmlns:m="http://schemas.openxmlformats.org/officeDocument/2006/math" xmlns:w="http://schemas.openxmlformats.org/wordprocessingml/2006/main" matchingName="" preserve="1" showMasterPhAnim="0" showMasterSp="0" userDrawn="1">
   <p:cSld name="Name Card">
     <p:spTree>
       <p:nvGrpSpPr>
@@ -3828,9 +3828,7 @@
                   </a:schemeClr>
                 </a:duotone>
               </a:blip>
-              <a:stretch>
-                <a:fillRect/>
-              </a:stretch>
+              <a:stretch/>
             </a:blipFill>
             <a:ln>
               <a:noFill/>
@@ -4141,7 +4139,7 @@
               <a:cxnLst/>
               <a:rect l="l" t="t" r="r" b="b"/>
               <a:pathLst>
-                <a:path w="10000" h="5291" extrusionOk="0">
+                <a:path w="10000" h="5291" fill="norm" stroke="1" extrusionOk="0">
                   <a:moveTo>
                     <a:pt x="85" y="2532"/>
                   </a:moveTo>
@@ -4288,7 +4286,7 @@
               <a:cxnLst/>
               <a:rect l="l" t="t" r="r" b="b"/>
               <a:pathLst>
-                <a:path w="10000" h="8000" extrusionOk="0">
+                <a:path w="10000" h="8000" fill="norm" stroke="1" extrusionOk="0">
                   <a:moveTo>
                     <a:pt x="0" y="0"/>
                   </a:moveTo>
@@ -4474,7 +4472,7 @@
               <a:cxnLst/>
               <a:rect l="0" t="0" r="r" b="b"/>
               <a:pathLst>
-                <a:path w="15356" h="8638" extrusionOk="0">
+                <a:path w="15356" h="8638" fill="norm" stroke="1" extrusionOk="0">
                   <a:moveTo>
                     <a:pt x="0" y="0"/>
                   </a:moveTo>
@@ -4697,6 +4695,7 @@
             </a:pPr>
             <a:fld id="{BA38155F-AEC7-4C83-BD8B-86231E183429}" type="datetimeFigureOut">
               <a:rPr lang="en-US"/>
+              <a:t/>
             </a:fld>
             <a:endParaRPr lang="en-US"/>
           </a:p>
@@ -4780,6 +4779,7 @@
             </a:pPr>
             <a:fld id="{00E55A38-CD7B-4575-ADB2-599742FE9C88}" type="slidenum">
               <a:rPr lang="en-US"/>
+              <a:t/>
             </a:fld>
             <a:endParaRPr lang="en-US"/>
           </a:p>
@@ -4794,7 +4794,7 @@
 </file>
 
 <file path=ppt/slideLayouts/slideLayout14.xml><?xml version="1.0" encoding="utf-8"?>
-<p:sldLayout xmlns:a="http://schemas.openxmlformats.org/drawingml/2006/main" xmlns:r="http://schemas.openxmlformats.org/officeDocument/2006/relationships" xmlns:p="http://schemas.openxmlformats.org/presentationml/2006/main" preserve="1" showMasterPhAnim="0" userDrawn="1">
+<p:sldLayout xmlns:a="http://schemas.openxmlformats.org/drawingml/2006/main" xmlns:r="http://schemas.openxmlformats.org/officeDocument/2006/relationships" xmlns:p="http://schemas.openxmlformats.org/presentationml/2006/main" xmlns:m="http://schemas.openxmlformats.org/officeDocument/2006/math" xmlns:w="http://schemas.openxmlformats.org/wordprocessingml/2006/main" matchingName="" preserve="1" showMasterPhAnim="0" userDrawn="1">
   <p:cSld name="3 Column">
     <p:spTree>
       <p:nvGrpSpPr>
@@ -5289,7 +5289,9 @@
       <p:cxnSp>
         <p:nvCxnSpPr>
           <p:cNvPr id="17" name="Straight Connector 16"/>
-          <p:cNvCxnSpPr/>
+          <p:cNvCxnSpPr>
+            <a:cxnSpLocks/>
+          </p:cNvCxnSpPr>
           <p:nvPr/>
         </p:nvCxnSpPr>
         <p:spPr bwMode="auto">
@@ -5326,7 +5328,9 @@
       <p:cxnSp>
         <p:nvCxnSpPr>
           <p:cNvPr id="18" name="Straight Connector 17"/>
-          <p:cNvCxnSpPr/>
+          <p:cNvCxnSpPr>
+            <a:cxnSpLocks/>
+          </p:cNvCxnSpPr>
           <p:nvPr/>
         </p:nvCxnSpPr>
         <p:spPr bwMode="auto">
@@ -5380,6 +5384,7 @@
             </a:pPr>
             <a:fld id="{BA38155F-AEC7-4C83-BD8B-86231E183429}" type="datetimeFigureOut">
               <a:rPr lang="en-US"/>
+              <a:t/>
             </a:fld>
             <a:endParaRPr lang="en-US"/>
           </a:p>
@@ -5427,6 +5432,7 @@
             </a:pPr>
             <a:fld id="{00E55A38-CD7B-4575-ADB2-599742FE9C88}" type="slidenum">
               <a:rPr lang="en-US"/>
+              <a:t/>
             </a:fld>
             <a:endParaRPr lang="en-US"/>
           </a:p>
@@ -5441,7 +5447,7 @@
 </file>
 
 <file path=ppt/slideLayouts/slideLayout15.xml><?xml version="1.0" encoding="utf-8"?>
-<p:sldLayout xmlns:a="http://schemas.openxmlformats.org/drawingml/2006/main" xmlns:r="http://schemas.openxmlformats.org/officeDocument/2006/relationships" xmlns:p="http://schemas.openxmlformats.org/presentationml/2006/main" preserve="1" showMasterPhAnim="0" userDrawn="1">
+<p:sldLayout xmlns:a="http://schemas.openxmlformats.org/drawingml/2006/main" xmlns:r="http://schemas.openxmlformats.org/officeDocument/2006/relationships" xmlns:p="http://schemas.openxmlformats.org/presentationml/2006/main" xmlns:m="http://schemas.openxmlformats.org/officeDocument/2006/math" xmlns:w="http://schemas.openxmlformats.org/wordprocessingml/2006/main" matchingName="" preserve="1" showMasterPhAnim="0" userDrawn="1">
   <p:cSld name="3 Picture Column">
     <p:spTree>
       <p:nvGrpSpPr>
@@ -5573,7 +5579,7 @@
         <p:nvSpPr>
           <p:cNvPr id="19" name="Picture Placeholder 2"/>
           <p:cNvSpPr>
-            <a:spLocks noGrp="1" noChangeAspect="1"/>
+            <a:spLocks noChangeAspect="1" noGrp="1"/>
           </p:cNvSpPr>
           <p:nvPr>
             <p:ph type="pic" idx="15"/>
@@ -5802,7 +5808,7 @@
         <p:nvSpPr>
           <p:cNvPr id="41" name="Picture Placeholder 2"/>
           <p:cNvSpPr>
-            <a:spLocks noGrp="1" noChangeAspect="1"/>
+            <a:spLocks noChangeAspect="1" noGrp="1"/>
           </p:cNvSpPr>
           <p:nvPr>
             <p:ph type="pic" idx="21"/>
@@ -6031,7 +6037,7 @@
         <p:nvSpPr>
           <p:cNvPr id="42" name="Picture Placeholder 2"/>
           <p:cNvSpPr>
-            <a:spLocks noGrp="1" noChangeAspect="1"/>
+            <a:spLocks noChangeAspect="1" noGrp="1"/>
           </p:cNvSpPr>
           <p:nvPr>
             <p:ph type="pic" idx="22"/>
@@ -6182,7 +6188,9 @@
       <p:cxnSp>
         <p:nvCxnSpPr>
           <p:cNvPr id="43" name="Straight Connector 42"/>
-          <p:cNvCxnSpPr/>
+          <p:cNvCxnSpPr>
+            <a:cxnSpLocks/>
+          </p:cNvCxnSpPr>
           <p:nvPr/>
         </p:nvCxnSpPr>
         <p:spPr bwMode="auto">
@@ -6219,7 +6227,9 @@
       <p:cxnSp>
         <p:nvCxnSpPr>
           <p:cNvPr id="44" name="Straight Connector 43"/>
-          <p:cNvCxnSpPr/>
+          <p:cNvCxnSpPr>
+            <a:cxnSpLocks/>
+          </p:cNvCxnSpPr>
           <p:nvPr/>
         </p:nvCxnSpPr>
         <p:spPr bwMode="auto">
@@ -6273,6 +6283,7 @@
             </a:pPr>
             <a:fld id="{BA38155F-AEC7-4C83-BD8B-86231E183429}" type="datetimeFigureOut">
               <a:rPr lang="en-US"/>
+              <a:t/>
             </a:fld>
             <a:endParaRPr lang="en-US"/>
           </a:p>
@@ -6325,6 +6336,7 @@
             </a:pPr>
             <a:fld id="{00E55A38-CD7B-4575-ADB2-599742FE9C88}" type="slidenum">
               <a:rPr lang="en-US"/>
+              <a:t/>
             </a:fld>
             <a:endParaRPr lang="en-US"/>
           </a:p>
@@ -6339,7 +6351,7 @@
 </file>
 
 <file path=ppt/slideLayouts/slideLayout16.xml><?xml version="1.0" encoding="utf-8"?>
-<p:sldLayout xmlns:a="http://schemas.openxmlformats.org/drawingml/2006/main" xmlns:r="http://schemas.openxmlformats.org/officeDocument/2006/relationships" xmlns:p="http://schemas.openxmlformats.org/presentationml/2006/main" type="vertTx" preserve="1" showMasterPhAnim="0" userDrawn="1">
+<p:sldLayout xmlns:a="http://schemas.openxmlformats.org/drawingml/2006/main" xmlns:r="http://schemas.openxmlformats.org/officeDocument/2006/relationships" xmlns:p="http://schemas.openxmlformats.org/presentationml/2006/main" xmlns:m="http://schemas.openxmlformats.org/officeDocument/2006/math" xmlns:w="http://schemas.openxmlformats.org/wordprocessingml/2006/main" matchingName="" preserve="1" showMasterPhAnim="0" type="vertTx" userDrawn="1">
   <p:cSld name="Title and Vertical Text">
     <p:spTree>
       <p:nvGrpSpPr>
@@ -6482,6 +6494,7 @@
             </a:pPr>
             <a:fld id="{BA38155F-AEC7-4C83-BD8B-86231E183429}" type="datetimeFigureOut">
               <a:rPr lang="en-US"/>
+              <a:t/>
             </a:fld>
             <a:endParaRPr lang="en-US"/>
           </a:p>
@@ -6529,6 +6542,7 @@
             </a:pPr>
             <a:fld id="{00E55A38-CD7B-4575-ADB2-599742FE9C88}" type="slidenum">
               <a:rPr lang="en-US"/>
+              <a:t/>
             </a:fld>
             <a:endParaRPr lang="en-US"/>
           </a:p>
@@ -6543,7 +6557,7 @@
 </file>
 
 <file path=ppt/slideLayouts/slideLayout17.xml><?xml version="1.0" encoding="utf-8"?>
-<p:sldLayout xmlns:a="http://schemas.openxmlformats.org/drawingml/2006/main" xmlns:r="http://schemas.openxmlformats.org/officeDocument/2006/relationships" xmlns:p="http://schemas.openxmlformats.org/presentationml/2006/main" type="vertTitleAndTx" preserve="1" showMasterPhAnim="0" showMasterSp="0" userDrawn="1">
+<p:sldLayout xmlns:a="http://schemas.openxmlformats.org/drawingml/2006/main" xmlns:r="http://schemas.openxmlformats.org/officeDocument/2006/relationships" xmlns:p="http://schemas.openxmlformats.org/presentationml/2006/main" xmlns:m="http://schemas.openxmlformats.org/officeDocument/2006/math" xmlns:w="http://schemas.openxmlformats.org/wordprocessingml/2006/main" matchingName="" preserve="1" showMasterPhAnim="0" showMasterSp="0" type="vertTitleAndTx" userDrawn="1">
   <p:cSld name="Vertical Title and Text">
     <p:spTree>
       <p:nvGrpSpPr>
@@ -6603,9 +6617,7 @@
                   </a:schemeClr>
                 </a:duotone>
               </a:blip>
-              <a:stretch>
-                <a:fillRect/>
-              </a:stretch>
+              <a:stretch/>
             </a:blipFill>
             <a:ln>
               <a:noFill/>
@@ -6953,7 +6965,7 @@
               <a:cxnLst/>
               <a:rect l="l" t="t" r="r" b="b"/>
               <a:pathLst>
-                <a:path w="10000" h="5291" extrusionOk="0">
+                <a:path w="10000" h="5291" fill="norm" stroke="1" extrusionOk="0">
                   <a:moveTo>
                     <a:pt x="85" y="2532"/>
                   </a:moveTo>
@@ -7100,7 +7112,7 @@
               <a:cxnLst/>
               <a:rect l="l" t="t" r="r" b="b"/>
               <a:pathLst>
-                <a:path w="10000" h="8000" extrusionOk="0">
+                <a:path w="10000" h="8000" fill="norm" stroke="1" extrusionOk="0">
                   <a:moveTo>
                     <a:pt x="0" y="0"/>
                   </a:moveTo>
@@ -7286,7 +7298,7 @@
               <a:cxnLst/>
               <a:rect l="0" t="0" r="r" b="b"/>
               <a:pathLst>
-                <a:path w="15356" h="8638" extrusionOk="0">
+                <a:path w="15356" h="8638" fill="norm" stroke="1" extrusionOk="0">
                   <a:moveTo>
                     <a:pt x="0" y="0"/>
                   </a:moveTo>
@@ -7458,6 +7470,7 @@
             </a:pPr>
             <a:fld id="{BA38155F-AEC7-4C83-BD8B-86231E183429}" type="datetimeFigureOut">
               <a:rPr lang="en-US"/>
+              <a:t/>
             </a:fld>
             <a:endParaRPr lang="en-US"/>
           </a:p>
@@ -7541,6 +7554,7 @@
             </a:pPr>
             <a:fld id="{00E55A38-CD7B-4575-ADB2-599742FE9C88}" type="slidenum">
               <a:rPr lang="en-US"/>
+              <a:t/>
             </a:fld>
             <a:endParaRPr lang="en-US"/>
           </a:p>
@@ -7555,7 +7569,7 @@
 </file>
 
 <file path=ppt/slideLayouts/slideLayout2.xml><?xml version="1.0" encoding="utf-8"?>
-<p:sldLayout xmlns:a="http://schemas.openxmlformats.org/drawingml/2006/main" xmlns:r="http://schemas.openxmlformats.org/officeDocument/2006/relationships" xmlns:p="http://schemas.openxmlformats.org/presentationml/2006/main" type="obj" preserve="1" showMasterPhAnim="0" userDrawn="1">
+<p:sldLayout xmlns:a="http://schemas.openxmlformats.org/drawingml/2006/main" xmlns:r="http://schemas.openxmlformats.org/officeDocument/2006/relationships" xmlns:p="http://schemas.openxmlformats.org/presentationml/2006/main" xmlns:m="http://schemas.openxmlformats.org/officeDocument/2006/math" xmlns:w="http://schemas.openxmlformats.org/wordprocessingml/2006/main" matchingName="" preserve="1" showMasterPhAnim="0" type="obj" userDrawn="1">
   <p:cSld name="Title and Content">
     <p:spTree>
       <p:nvGrpSpPr>
@@ -7688,6 +7702,7 @@
             </a:pPr>
             <a:fld id="{BA38155F-AEC7-4C83-BD8B-86231E183429}" type="datetimeFigureOut">
               <a:rPr lang="en-US"/>
+              <a:t/>
             </a:fld>
             <a:endParaRPr lang="en-US"/>
           </a:p>
@@ -7735,6 +7750,7 @@
             </a:pPr>
             <a:fld id="{00E55A38-CD7B-4575-ADB2-599742FE9C88}" type="slidenum">
               <a:rPr lang="en-US"/>
+              <a:t/>
             </a:fld>
             <a:endParaRPr lang="en-US"/>
           </a:p>
@@ -7749,7 +7765,7 @@
 </file>
 
 <file path=ppt/slideLayouts/slideLayout3.xml><?xml version="1.0" encoding="utf-8"?>
-<p:sldLayout xmlns:a="http://schemas.openxmlformats.org/drawingml/2006/main" xmlns:r="http://schemas.openxmlformats.org/officeDocument/2006/relationships" xmlns:p="http://schemas.openxmlformats.org/presentationml/2006/main" type="secHead" preserve="1" showMasterPhAnim="0" showMasterSp="0" userDrawn="1">
+<p:sldLayout xmlns:a="http://schemas.openxmlformats.org/drawingml/2006/main" xmlns:r="http://schemas.openxmlformats.org/officeDocument/2006/relationships" xmlns:p="http://schemas.openxmlformats.org/presentationml/2006/main" xmlns:m="http://schemas.openxmlformats.org/officeDocument/2006/math" xmlns:w="http://schemas.openxmlformats.org/wordprocessingml/2006/main" matchingName="" preserve="1" showMasterPhAnim="0" showMasterSp="0" type="secHead" userDrawn="1">
   <p:cSld name="Section Header">
     <p:spTree>
       <p:nvGrpSpPr>
@@ -7809,9 +7825,7 @@
                   </a:schemeClr>
                 </a:duotone>
               </a:blip>
-              <a:stretch>
-                <a:fillRect/>
-              </a:stretch>
+              <a:stretch/>
             </a:blipFill>
             <a:ln>
               <a:noFill/>
@@ -8159,7 +8173,7 @@
               <a:cxnLst/>
               <a:rect l="l" t="t" r="r" b="b"/>
               <a:pathLst>
-                <a:path w="10000" h="8000" extrusionOk="0">
+                <a:path w="10000" h="8000" fill="norm" stroke="1" extrusionOk="0">
                   <a:moveTo>
                     <a:pt x="0" y="0"/>
                   </a:moveTo>
@@ -8343,7 +8357,7 @@
               <a:cxnLst/>
               <a:rect l="l" t="t" r="r" b="b"/>
               <a:pathLst>
-                <a:path w="10000" h="5291" extrusionOk="0">
+                <a:path w="10000" h="5291" fill="norm" stroke="1" extrusionOk="0">
                   <a:moveTo>
                     <a:pt x="85" y="2532"/>
                   </a:moveTo>
@@ -8492,7 +8506,7 @@
               <a:cxnLst/>
               <a:rect l="0" t="0" r="r" b="b"/>
               <a:pathLst>
-                <a:path w="15356" h="8638" extrusionOk="0">
+                <a:path w="15356" h="8638" fill="norm" stroke="1" extrusionOk="0">
                   <a:moveTo>
                     <a:pt x="0" y="0"/>
                   </a:moveTo>
@@ -8715,6 +8729,7 @@
             </a:pPr>
             <a:fld id="{BA38155F-AEC7-4C83-BD8B-86231E183429}" type="datetimeFigureOut">
               <a:rPr lang="en-US"/>
+              <a:t/>
             </a:fld>
             <a:endParaRPr lang="en-US"/>
           </a:p>
@@ -8798,6 +8813,7 @@
             </a:pPr>
             <a:fld id="{00E55A38-CD7B-4575-ADB2-599742FE9C88}" type="slidenum">
               <a:rPr lang="en-US"/>
+              <a:t/>
             </a:fld>
             <a:endParaRPr lang="en-US"/>
           </a:p>
@@ -8812,7 +8828,7 @@
 </file>
 
 <file path=ppt/slideLayouts/slideLayout4.xml><?xml version="1.0" encoding="utf-8"?>
-<p:sldLayout xmlns:a="http://schemas.openxmlformats.org/drawingml/2006/main" xmlns:r="http://schemas.openxmlformats.org/officeDocument/2006/relationships" xmlns:p="http://schemas.openxmlformats.org/presentationml/2006/main" type="twoObj" preserve="1" showMasterPhAnim="0" userDrawn="1">
+<p:sldLayout xmlns:a="http://schemas.openxmlformats.org/drawingml/2006/main" xmlns:r="http://schemas.openxmlformats.org/officeDocument/2006/relationships" xmlns:p="http://schemas.openxmlformats.org/presentationml/2006/main" xmlns:m="http://schemas.openxmlformats.org/officeDocument/2006/math" xmlns:w="http://schemas.openxmlformats.org/wordprocessingml/2006/main" matchingName="" preserve="1" showMasterPhAnim="0" type="twoObj" userDrawn="1">
   <p:cSld name="Two Content">
     <p:spTree>
       <p:nvGrpSpPr>
@@ -9020,6 +9036,7 @@
             </a:pPr>
             <a:fld id="{BA38155F-AEC7-4C83-BD8B-86231E183429}" type="datetimeFigureOut">
               <a:rPr lang="en-US"/>
+              <a:t/>
             </a:fld>
             <a:endParaRPr lang="en-US"/>
           </a:p>
@@ -9067,6 +9084,7 @@
             </a:pPr>
             <a:fld id="{00E55A38-CD7B-4575-ADB2-599742FE9C88}" type="slidenum">
               <a:rPr lang="en-US"/>
+              <a:t/>
             </a:fld>
             <a:endParaRPr lang="en-US"/>
           </a:p>
@@ -9081,7 +9099,7 @@
 </file>
 
 <file path=ppt/slideLayouts/slideLayout5.xml><?xml version="1.0" encoding="utf-8"?>
-<p:sldLayout xmlns:a="http://schemas.openxmlformats.org/drawingml/2006/main" xmlns:r="http://schemas.openxmlformats.org/officeDocument/2006/relationships" xmlns:p="http://schemas.openxmlformats.org/presentationml/2006/main" type="twoTxTwoObj" preserve="1" showMasterPhAnim="0" userDrawn="1">
+<p:sldLayout xmlns:a="http://schemas.openxmlformats.org/drawingml/2006/main" xmlns:r="http://schemas.openxmlformats.org/officeDocument/2006/relationships" xmlns:p="http://schemas.openxmlformats.org/presentationml/2006/main" xmlns:m="http://schemas.openxmlformats.org/officeDocument/2006/math" xmlns:w="http://schemas.openxmlformats.org/wordprocessingml/2006/main" matchingName="" preserve="1" showMasterPhAnim="0" type="twoTxTwoObj" userDrawn="1">
   <p:cSld name="Comparison">
     <p:spTree>
       <p:nvGrpSpPr>
@@ -9469,6 +9487,7 @@
             </a:pPr>
             <a:fld id="{BA38155F-AEC7-4C83-BD8B-86231E183429}" type="datetimeFigureOut">
               <a:rPr lang="en-US"/>
+              <a:t/>
             </a:fld>
             <a:endParaRPr lang="en-US"/>
           </a:p>
@@ -9516,6 +9535,7 @@
             </a:pPr>
             <a:fld id="{00E55A38-CD7B-4575-ADB2-599742FE9C88}" type="slidenum">
               <a:rPr lang="en-US"/>
+              <a:t/>
             </a:fld>
             <a:endParaRPr lang="en-US"/>
           </a:p>
@@ -9530,7 +9550,7 @@
 </file>
 
 <file path=ppt/slideLayouts/slideLayout6.xml><?xml version="1.0" encoding="utf-8"?>
-<p:sldLayout xmlns:a="http://schemas.openxmlformats.org/drawingml/2006/main" xmlns:r="http://schemas.openxmlformats.org/officeDocument/2006/relationships" xmlns:p="http://schemas.openxmlformats.org/presentationml/2006/main" type="titleOnly" preserve="1" showMasterPhAnim="0" userDrawn="1">
+<p:sldLayout xmlns:a="http://schemas.openxmlformats.org/drawingml/2006/main" xmlns:r="http://schemas.openxmlformats.org/officeDocument/2006/relationships" xmlns:p="http://schemas.openxmlformats.org/presentationml/2006/main" xmlns:m="http://schemas.openxmlformats.org/officeDocument/2006/math" xmlns:w="http://schemas.openxmlformats.org/wordprocessingml/2006/main" matchingName="" preserve="1" showMasterPhAnim="0" type="titleOnly" userDrawn="1">
   <p:cSld name="Title Only">
     <p:spTree>
       <p:nvGrpSpPr>
@@ -9601,6 +9621,7 @@
             </a:pPr>
             <a:fld id="{BA38155F-AEC7-4C83-BD8B-86231E183429}" type="datetimeFigureOut">
               <a:rPr lang="en-US"/>
+              <a:t/>
             </a:fld>
             <a:endParaRPr lang="en-US"/>
           </a:p>
@@ -9648,6 +9669,7 @@
             </a:pPr>
             <a:fld id="{00E55A38-CD7B-4575-ADB2-599742FE9C88}" type="slidenum">
               <a:rPr lang="en-US"/>
+              <a:t/>
             </a:fld>
             <a:endParaRPr lang="en-US"/>
           </a:p>
@@ -9662,7 +9684,7 @@
 </file>
 
 <file path=ppt/slideLayouts/slideLayout7.xml><?xml version="1.0" encoding="utf-8"?>
-<p:sldLayout xmlns:a="http://schemas.openxmlformats.org/drawingml/2006/main" xmlns:r="http://schemas.openxmlformats.org/officeDocument/2006/relationships" xmlns:p="http://schemas.openxmlformats.org/presentationml/2006/main" type="blank" preserve="1" showMasterPhAnim="0" showMasterSp="0" userDrawn="1">
+<p:sldLayout xmlns:a="http://schemas.openxmlformats.org/drawingml/2006/main" xmlns:r="http://schemas.openxmlformats.org/officeDocument/2006/relationships" xmlns:p="http://schemas.openxmlformats.org/presentationml/2006/main" xmlns:m="http://schemas.openxmlformats.org/officeDocument/2006/math" xmlns:w="http://schemas.openxmlformats.org/wordprocessingml/2006/main" matchingName="" preserve="1" showMasterPhAnim="0" showMasterSp="0" type="blank" userDrawn="1">
   <p:cSld name="Blank">
     <p:spTree>
       <p:nvGrpSpPr>
@@ -9698,6 +9720,7 @@
             </a:pPr>
             <a:fld id="{BA38155F-AEC7-4C83-BD8B-86231E183429}" type="datetimeFigureOut">
               <a:rPr lang="en-US"/>
+              <a:t/>
             </a:fld>
             <a:endParaRPr lang="en-US"/>
           </a:p>
@@ -9781,6 +9804,7 @@
             </a:pPr>
             <a:fld id="{00E55A38-CD7B-4575-ADB2-599742FE9C88}" type="slidenum">
               <a:rPr lang="en-US"/>
+              <a:t/>
             </a:fld>
             <a:endParaRPr lang="en-US"/>
           </a:p>
@@ -9795,7 +9819,7 @@
 </file>
 
 <file path=ppt/slideLayouts/slideLayout8.xml><?xml version="1.0" encoding="utf-8"?>
-<p:sldLayout xmlns:a="http://schemas.openxmlformats.org/drawingml/2006/main" xmlns:r="http://schemas.openxmlformats.org/officeDocument/2006/relationships" xmlns:p="http://schemas.openxmlformats.org/presentationml/2006/main" type="objTx" preserve="1" showMasterPhAnim="0" showMasterSp="0" userDrawn="1">
+<p:sldLayout xmlns:a="http://schemas.openxmlformats.org/drawingml/2006/main" xmlns:r="http://schemas.openxmlformats.org/officeDocument/2006/relationships" xmlns:p="http://schemas.openxmlformats.org/presentationml/2006/main" xmlns:m="http://schemas.openxmlformats.org/officeDocument/2006/math" xmlns:w="http://schemas.openxmlformats.org/wordprocessingml/2006/main" matchingName="" preserve="1" showMasterPhAnim="0" showMasterSp="0" type="objTx" userDrawn="1">
   <p:cSld name="Content with Caption">
     <p:spTree>
       <p:nvGrpSpPr>
@@ -9855,9 +9879,7 @@
                   </a:schemeClr>
                 </a:duotone>
               </a:blip>
-              <a:stretch>
-                <a:fillRect/>
-              </a:stretch>
+              <a:stretch/>
             </a:blipFill>
             <a:ln>
               <a:noFill/>
@@ -10205,7 +10227,7 @@
               <a:cxnLst/>
               <a:rect l="l" t="t" r="r" b="b"/>
               <a:pathLst>
-                <a:path w="10000" h="5291" extrusionOk="0">
+                <a:path w="10000" h="5291" fill="norm" stroke="1" extrusionOk="0">
                   <a:moveTo>
                     <a:pt x="85" y="2532"/>
                   </a:moveTo>
@@ -10352,7 +10374,7 @@
               <a:cxnLst/>
               <a:rect l="l" t="t" r="r" b="b"/>
               <a:pathLst>
-                <a:path w="10000" h="8000" extrusionOk="0">
+                <a:path w="10000" h="8000" fill="norm" stroke="1" extrusionOk="0">
                   <a:moveTo>
                     <a:pt x="0" y="0"/>
                   </a:moveTo>
@@ -10538,7 +10560,7 @@
               <a:cxnLst/>
               <a:rect l="0" t="0" r="r" b="b"/>
               <a:pathLst>
-                <a:path w="15356" h="8638" extrusionOk="0">
+                <a:path w="15356" h="8638" fill="norm" stroke="1" extrusionOk="0">
                   <a:moveTo>
                     <a:pt x="0" y="0"/>
                   </a:moveTo>
@@ -10786,6 +10808,7 @@
             </a:pPr>
             <a:fld id="{BA38155F-AEC7-4C83-BD8B-86231E183429}" type="datetimeFigureOut">
               <a:rPr lang="en-US"/>
+              <a:t/>
             </a:fld>
             <a:endParaRPr lang="en-US"/>
           </a:p>
@@ -10869,6 +10892,7 @@
             </a:pPr>
             <a:fld id="{00E55A38-CD7B-4575-ADB2-599742FE9C88}" type="slidenum">
               <a:rPr lang="en-US"/>
+              <a:t/>
             </a:fld>
             <a:endParaRPr lang="en-US"/>
           </a:p>
@@ -10883,7 +10907,7 @@
 </file>
 
 <file path=ppt/slideLayouts/slideLayout9.xml><?xml version="1.0" encoding="utf-8"?>
-<p:sldLayout xmlns:a="http://schemas.openxmlformats.org/drawingml/2006/main" xmlns:r="http://schemas.openxmlformats.org/officeDocument/2006/relationships" xmlns:p="http://schemas.openxmlformats.org/presentationml/2006/main" type="picTx" preserve="1" showMasterPhAnim="0" showMasterSp="0" userDrawn="1">
+<p:sldLayout xmlns:a="http://schemas.openxmlformats.org/drawingml/2006/main" xmlns:r="http://schemas.openxmlformats.org/officeDocument/2006/relationships" xmlns:p="http://schemas.openxmlformats.org/presentationml/2006/main" xmlns:m="http://schemas.openxmlformats.org/officeDocument/2006/math" xmlns:w="http://schemas.openxmlformats.org/wordprocessingml/2006/main" matchingName="" preserve="1" showMasterPhAnim="0" showMasterSp="0" type="picTx" userDrawn="1">
   <p:cSld name="Picture with Caption">
     <p:spTree>
       <p:nvGrpSpPr>
@@ -10943,9 +10967,7 @@
                   </a:schemeClr>
                 </a:duotone>
               </a:blip>
-              <a:stretch>
-                <a:fillRect/>
-              </a:stretch>
+              <a:stretch/>
             </a:blipFill>
             <a:ln>
               <a:noFill/>
@@ -11293,7 +11315,7 @@
               <a:cxnLst/>
               <a:rect l="l" t="t" r="r" b="b"/>
               <a:pathLst>
-                <a:path w="10000" h="5291" extrusionOk="0">
+                <a:path w="10000" h="5291" fill="norm" stroke="1" extrusionOk="0">
                   <a:moveTo>
                     <a:pt x="85" y="2532"/>
                   </a:moveTo>
@@ -11440,7 +11462,7 @@
               <a:cxnLst/>
               <a:rect l="l" t="t" r="r" b="b"/>
               <a:pathLst>
-                <a:path w="10000" h="8000" extrusionOk="0">
+                <a:path w="10000" h="8000" fill="norm" stroke="1" extrusionOk="0">
                   <a:moveTo>
                     <a:pt x="0" y="0"/>
                   </a:moveTo>
@@ -11626,7 +11648,7 @@
               <a:cxnLst/>
               <a:rect l="0" t="0" r="r" b="b"/>
               <a:pathLst>
-                <a:path w="15356" h="8638" extrusionOk="0">
+                <a:path w="15356" h="8638" fill="norm" stroke="1" extrusionOk="0">
                   <a:moveTo>
                     <a:pt x="0" y="0"/>
                   </a:moveTo>
@@ -11712,7 +11734,7 @@
         <p:nvSpPr>
           <p:cNvPr id="3" name="Picture Placeholder 2"/>
           <p:cNvSpPr>
-            <a:spLocks noGrp="1" noChangeAspect="1"/>
+            <a:spLocks noChangeAspect="1" noGrp="1"/>
           </p:cNvSpPr>
           <p:nvPr>
             <p:ph type="pic" idx="1"/>
@@ -11888,6 +11910,7 @@
             </a:pPr>
             <a:fld id="{BA38155F-AEC7-4C83-BD8B-86231E183429}" type="datetimeFigureOut">
               <a:rPr lang="en-US"/>
+              <a:t/>
             </a:fld>
             <a:endParaRPr lang="en-US"/>
           </a:p>
@@ -11971,6 +11994,7 @@
             </a:pPr>
             <a:fld id="{00E55A38-CD7B-4575-ADB2-599742FE9C88}" type="slidenum">
               <a:rPr lang="en-US"/>
+              <a:t/>
             </a:fld>
             <a:endParaRPr lang="en-US"/>
           </a:p>
@@ -11985,8 +12009,8 @@
 </file>
 
 <file path=ppt/slideMasters/slideMaster1.xml><?xml version="1.0" encoding="utf-8"?>
-<p:sldMaster xmlns:a="http://schemas.openxmlformats.org/drawingml/2006/main" xmlns:r="http://schemas.openxmlformats.org/officeDocument/2006/relationships" xmlns:p="http://schemas.openxmlformats.org/presentationml/2006/main">
-  <p:cSld>
+<p:sldMaster xmlns:a="http://schemas.openxmlformats.org/drawingml/2006/main" xmlns:r="http://schemas.openxmlformats.org/officeDocument/2006/relationships" xmlns:p="http://schemas.openxmlformats.org/presentationml/2006/main" xmlns:m="http://schemas.openxmlformats.org/officeDocument/2006/math" xmlns:w="http://schemas.openxmlformats.org/wordprocessingml/2006/main" preserve="0">
+  <p:cSld name="">
     <p:bg>
       <p:bgRef idx="1001">
         <a:schemeClr val="bg1"/>
@@ -12035,7 +12059,7 @@
               <a:avLst/>
             </a:prstGeom>
             <a:blipFill>
-              <a:blip r:embed="rId18">
+              <a:blip r:embed="rId19">
                 <a:duotone>
                   <a:schemeClr val="dk2">
                     <a:shade val="69000"/>
@@ -12050,9 +12074,7 @@
                   </a:schemeClr>
                 </a:duotone>
               </a:blip>
-              <a:stretch>
-                <a:fillRect/>
-              </a:stretch>
+              <a:stretch/>
             </a:blipFill>
             <a:ln>
               <a:noFill/>
@@ -12363,7 +12385,7 @@
               <a:cxnLst/>
               <a:rect l="l" t="t" r="r" b="b"/>
               <a:pathLst>
-                <a:path w="10000" h="5291" extrusionOk="0">
+                <a:path w="10000" h="5291" fill="norm" stroke="1" extrusionOk="0">
                   <a:moveTo>
                     <a:pt x="85" y="2532"/>
                   </a:moveTo>
@@ -12510,7 +12532,7 @@
               <a:cxnLst/>
               <a:rect l="0" t="0" r="r" b="b"/>
               <a:pathLst>
-                <a:path w="7104" h="2856" extrusionOk="0">
+                <a:path w="7104" h="2856" fill="norm" stroke="1" extrusionOk="0">
                   <a:moveTo>
                     <a:pt x="0" y="0"/>
                   </a:moveTo>
@@ -12696,7 +12718,7 @@
               <a:cxnLst/>
               <a:rect l="0" t="0" r="r" b="b"/>
               <a:pathLst>
-                <a:path w="15356" h="8638" extrusionOk="0">
+                <a:path w="15356" h="8638" fill="norm" stroke="1" extrusionOk="0">
                   <a:moveTo>
                     <a:pt x="0" y="0"/>
                   </a:moveTo>
@@ -12889,6 +12911,7 @@
             </a:pPr>
             <a:fld id="{BA38155F-AEC7-4C83-BD8B-86231E183429}" type="datetimeFigureOut">
               <a:rPr lang="en-US"/>
+              <a:t/>
             </a:fld>
             <a:endParaRPr lang="en-US"/>
           </a:p>
@@ -13004,6 +13027,7 @@
             </a:pPr>
             <a:fld id="{00E55A38-CD7B-4575-ADB2-599742FE9C88}" type="slidenum">
               <a:rPr lang="en-US"/>
+              <a:t/>
             </a:fld>
             <a:endParaRPr lang="en-US"/>
           </a:p>
@@ -13431,8 +13455,8 @@
 </file>
 
 <file path=ppt/slides/slide1.xml><?xml version="1.0" encoding="utf-8"?>
-<p:sld xmlns:a="http://schemas.openxmlformats.org/drawingml/2006/main" xmlns:r="http://schemas.openxmlformats.org/officeDocument/2006/relationships" xmlns:p="http://schemas.openxmlformats.org/presentationml/2006/main" showMasterPhAnim="0">
-  <p:cSld>
+<p:sld xmlns:a="http://schemas.openxmlformats.org/drawingml/2006/main" xmlns:r="http://schemas.openxmlformats.org/officeDocument/2006/relationships" xmlns:p="http://schemas.openxmlformats.org/presentationml/2006/main" xmlns:m="http://schemas.openxmlformats.org/officeDocument/2006/math" xmlns:w="http://schemas.openxmlformats.org/wordprocessingml/2006/main" showMasterPhAnim="0" show="1">
+  <p:cSld name="">
     <p:spTree>
       <p:nvGrpSpPr>
         <p:cNvPr id="1" name=""/>
@@ -13506,13 +13530,13 @@
   </p:clrMapOvr>
   <mc:AlternateContent xmlns:mc="http://schemas.openxmlformats.org/markup-compatibility/2006">
     <mc:Choice xmlns:p14="http://schemas.microsoft.com/office/powerpoint/2010/main" Requires="p14">
-      <p:transition spd="med" p14:dur="700">
-        <p:fade/>
+      <p:transition spd="med" p14:dur="700" advClick="1">
+        <p:fade thruBlk="0"/>
       </p:transition>
     </mc:Choice>
     <mc:Fallback>
-      <p:transition spd="med">
-        <p:fade/>
+      <p:transition spd="med" advClick="1">
+        <p:fade thruBlk="0"/>
       </p:transition>
     </mc:Fallback>
   </mc:AlternateContent>
@@ -13527,8 +13551,8 @@
 </file>
 
 <file path=ppt/slides/slide10.xml><?xml version="1.0" encoding="utf-8"?>
-<p:sld xmlns:a="http://schemas.openxmlformats.org/drawingml/2006/main" xmlns:r="http://schemas.openxmlformats.org/officeDocument/2006/relationships" xmlns:p="http://schemas.openxmlformats.org/presentationml/2006/main" showMasterPhAnim="0">
-  <p:cSld>
+<p:sld xmlns:a="http://schemas.openxmlformats.org/drawingml/2006/main" xmlns:r="http://schemas.openxmlformats.org/officeDocument/2006/relationships" xmlns:p="http://schemas.openxmlformats.org/presentationml/2006/main" xmlns:m="http://schemas.openxmlformats.org/officeDocument/2006/math" xmlns:w="http://schemas.openxmlformats.org/wordprocessingml/2006/main" showMasterPhAnim="0" show="1">
+  <p:cSld name="">
     <p:spTree>
       <p:nvGrpSpPr>
         <p:cNvPr id="1" name=""/>
@@ -13561,6 +13585,7 @@
             <a:pPr>
               <a:defRPr/>
             </a:pPr>
+            <a:endParaRPr/>
           </a:p>
         </p:txBody>
       </p:sp>
@@ -13577,7 +13602,7 @@
         <p:spPr bwMode="auto">
           <a:xfrm>
             <a:off x="1154953" y="2603499"/>
-            <a:ext cx="8825658" cy="3416299"/>
+            <a:ext cx="8825658" cy="3416298"/>
           </a:xfrm>
         </p:spPr>
         <p:txBody>
@@ -13602,18 +13627,18 @@
   </p:clrMapOvr>
   <mc:AlternateContent xmlns:mc="http://schemas.openxmlformats.org/markup-compatibility/2006">
     <mc:Choice xmlns:p14="http://schemas.microsoft.com/office/powerpoint/2010/main" Requires="p14">
-      <p:transition p14:dur="2000"/>
+      <p:transition p14:dur="2000" advClick="1"/>
     </mc:Choice>
     <mc:Fallback>
-      <p:transition/>
+      <p:transition advClick="1"/>
     </mc:Fallback>
   </mc:AlternateContent>
 </p:sld>
 </file>
 
 <file path=ppt/slides/slide2.xml><?xml version="1.0" encoding="utf-8"?>
-<p:sld xmlns:a="http://schemas.openxmlformats.org/drawingml/2006/main" xmlns:r="http://schemas.openxmlformats.org/officeDocument/2006/relationships" xmlns:p="http://schemas.openxmlformats.org/presentationml/2006/main" showMasterPhAnim="0">
-  <p:cSld>
+<p:sld xmlns:a="http://schemas.openxmlformats.org/drawingml/2006/main" xmlns:r="http://schemas.openxmlformats.org/officeDocument/2006/relationships" xmlns:p="http://schemas.openxmlformats.org/presentationml/2006/main" xmlns:m="http://schemas.openxmlformats.org/officeDocument/2006/math" xmlns:w="http://schemas.openxmlformats.org/wordprocessingml/2006/main" showMasterPhAnim="0" show="1">
+  <p:cSld name="">
     <p:spTree>
       <p:nvGrpSpPr>
         <p:cNvPr id="1" name=""/>
@@ -13763,13 +13788,13 @@
   </p:clrMapOvr>
   <mc:AlternateContent xmlns:mc="http://schemas.openxmlformats.org/markup-compatibility/2006">
     <mc:Choice xmlns:p14="http://schemas.microsoft.com/office/powerpoint/2010/main" Requires="p14">
-      <p:transition spd="med" p14:dur="700">
-        <p:fade/>
+      <p:transition spd="med" p14:dur="700" advClick="1">
+        <p:fade thruBlk="0"/>
       </p:transition>
     </mc:Choice>
     <mc:Fallback>
-      <p:transition spd="med">
-        <p:fade/>
+      <p:transition spd="med" advClick="1">
+        <p:fade thruBlk="0"/>
       </p:transition>
     </mc:Fallback>
   </mc:AlternateContent>
@@ -13784,8 +13809,8 @@
 </file>
 
 <file path=ppt/slides/slide3.xml><?xml version="1.0" encoding="utf-8"?>
-<p:sld xmlns:a="http://schemas.openxmlformats.org/drawingml/2006/main" xmlns:r="http://schemas.openxmlformats.org/officeDocument/2006/relationships" xmlns:p="http://schemas.openxmlformats.org/presentationml/2006/main" showMasterPhAnim="0">
-  <p:cSld>
+<p:sld xmlns:a="http://schemas.openxmlformats.org/drawingml/2006/main" xmlns:r="http://schemas.openxmlformats.org/officeDocument/2006/relationships" xmlns:p="http://schemas.openxmlformats.org/presentationml/2006/main" xmlns:m="http://schemas.openxmlformats.org/officeDocument/2006/math" xmlns:w="http://schemas.openxmlformats.org/wordprocessingml/2006/main" showMasterPhAnim="0" show="1">
+  <p:cSld name="">
     <p:spTree>
       <p:nvGrpSpPr>
         <p:cNvPr id="1" name=""/>
@@ -13851,6 +13876,28 @@
           </a:p>
         </p:txBody>
       </p:sp>
+      <p:pic>
+        <p:nvPicPr>
+          <p:cNvPr id="865434924" name=""/>
+          <p:cNvPicPr>
+            <a:picLocks noChangeAspect="1"/>
+          </p:cNvPicPr>
+          <p:nvPr/>
+        </p:nvPicPr>
+        <p:blipFill>
+          <a:blip r:embed="rId2"/>
+          <a:stretch/>
+        </p:blipFill>
+        <p:spPr bwMode="auto">
+          <a:xfrm flipH="0" flipV="0">
+            <a:off x="1067160" y="2293337"/>
+            <a:ext cx="7783904" cy="4613255"/>
+          </a:xfrm>
+          <a:prstGeom prst="rect">
+            <a:avLst/>
+          </a:prstGeom>
+        </p:spPr>
+      </p:pic>
     </p:spTree>
   </p:cSld>
   <p:clrMapOvr>
@@ -13858,13 +13905,13 @@
   </p:clrMapOvr>
   <mc:AlternateContent xmlns:mc="http://schemas.openxmlformats.org/markup-compatibility/2006">
     <mc:Choice xmlns:p14="http://schemas.microsoft.com/office/powerpoint/2010/main" Requires="p14">
-      <p:transition spd="med" p14:dur="700">
-        <p:fade/>
+      <p:transition spd="med" p14:dur="700" advClick="1">
+        <p:fade thruBlk="0"/>
       </p:transition>
     </mc:Choice>
     <mc:Fallback>
-      <p:transition spd="med">
-        <p:fade/>
+      <p:transition spd="med" advClick="1">
+        <p:fade thruBlk="0"/>
       </p:transition>
     </mc:Fallback>
   </mc:AlternateContent>
@@ -13879,8 +13926,8 @@
 </file>
 
 <file path=ppt/slides/slide4.xml><?xml version="1.0" encoding="utf-8"?>
-<p:sld xmlns:a="http://schemas.openxmlformats.org/drawingml/2006/main" xmlns:r="http://schemas.openxmlformats.org/officeDocument/2006/relationships" xmlns:p="http://schemas.openxmlformats.org/presentationml/2006/main" showMasterPhAnim="0">
-  <p:cSld>
+<p:sld xmlns:a="http://schemas.openxmlformats.org/drawingml/2006/main" xmlns:r="http://schemas.openxmlformats.org/officeDocument/2006/relationships" xmlns:p="http://schemas.openxmlformats.org/presentationml/2006/main" xmlns:m="http://schemas.openxmlformats.org/officeDocument/2006/math" xmlns:w="http://schemas.openxmlformats.org/wordprocessingml/2006/main" showMasterPhAnim="0" show="1">
+  <p:cSld name="">
     <p:spTree>
       <p:nvGrpSpPr>
         <p:cNvPr id="1" name=""/>
@@ -13953,6 +14000,7 @@
               <a:defRPr/>
             </a:pPr>
             <a:r>
+              <a:rPr/>
               <a:t>Use </a:t>
             </a:r>
             <a:r>
@@ -13960,6 +14008,7 @@
               <a:t>of </a:t>
             </a:r>
             <a:r>
+              <a:rPr/>
               <a:t>GPS coordinates as target points to be fed into the tractor from the</a:t>
             </a:r>
             <a:r>
@@ -13967,8 +14016,10 @@
               <a:t> internet or via LAN</a:t>
             </a:r>
             <a:r>
+              <a:rPr/>
               <a:t>.</a:t>
             </a:r>
+            <a:endParaRPr/>
           </a:p>
           <a:p>
             <a:pPr marL="0" indent="0">
@@ -13981,8 +14032,10 @@
               <a:defRPr/>
             </a:pPr>
             <a:r>
+              <a:rPr/>
               <a:t>Tractor capturing its own GPS signals and generation of the path of best fit between the destination and the current location.</a:t>
             </a:r>
+            <a:endParaRPr/>
           </a:p>
           <a:p>
             <a:pPr marL="0" indent="0">
@@ -13999,6 +14052,7 @@
               <a:t>Determine</a:t>
             </a:r>
             <a:r>
+              <a:rPr/>
               <a:t> </a:t>
             </a:r>
             <a:r>
@@ -14006,6 +14060,7 @@
               <a:t>any form of</a:t>
             </a:r>
             <a:r>
+              <a:rPr/>
               <a:t> d</a:t>
             </a:r>
             <a:r>
@@ -14013,12 +14068,14 @@
               <a:t>e</a:t>
             </a:r>
             <a:r>
+              <a:rPr/>
               <a:t>viation in its current course and adjusts appropriately</a:t>
             </a:r>
             <a:r>
               <a:rPr lang="en-US"/>
               <a:t>.</a:t>
             </a:r>
+            <a:endParaRPr/>
           </a:p>
           <a:p>
             <a:pPr marL="0" indent="0">
@@ -14031,6 +14088,7 @@
               <a:defRPr/>
             </a:pPr>
             <a:r>
+              <a:rPr/>
               <a:t>It uses PID (Proportional Integral Derivative) Control loop feedback mechanism for error compensation</a:t>
             </a:r>
             <a:r>
@@ -14038,8 +14096,10 @@
               <a:t> to get to its final point</a:t>
             </a:r>
             <a:r>
+              <a:rPr/>
               <a:t>.</a:t>
             </a:r>
+            <a:endParaRPr/>
           </a:p>
           <a:p>
             <a:pPr marL="0" indent="0">
@@ -14052,6 +14112,7 @@
               <a:defRPr/>
             </a:pPr>
             <a:r>
+              <a:rPr/>
               <a:t>The RaspberryPI </a:t>
             </a:r>
             <a:r>
@@ -14059,6 +14120,7 @@
               <a:t>microprocessor </a:t>
             </a:r>
             <a:r>
+              <a:rPr/>
               <a:t>module will handle most of the calculation and processes and use the Arduino </a:t>
             </a:r>
             <a:r>
@@ -14066,8 +14128,10 @@
               <a:t>microcontroller </a:t>
             </a:r>
             <a:r>
+              <a:rPr/>
               <a:t>to carry out the task.</a:t>
             </a:r>
+            <a:endParaRPr/>
           </a:p>
           <a:p>
             <a:pPr marL="0" indent="0">
@@ -14079,6 +14143,7 @@
               <a:buNone/>
               <a:defRPr/>
             </a:pPr>
+            <a:endParaRPr/>
           </a:p>
         </p:txBody>
       </p:sp>
@@ -14089,13 +14154,13 @@
   </p:clrMapOvr>
   <mc:AlternateContent xmlns:mc="http://schemas.openxmlformats.org/markup-compatibility/2006">
     <mc:Choice xmlns:p14="http://schemas.microsoft.com/office/powerpoint/2010/main" Requires="p14">
-      <p:transition spd="med" p14:dur="700">
-        <p:fade/>
+      <p:transition spd="med" p14:dur="700" advClick="1">
+        <p:fade thruBlk="0"/>
       </p:transition>
     </mc:Choice>
     <mc:Fallback>
-      <p:transition spd="med">
-        <p:fade/>
+      <p:transition spd="med" advClick="1">
+        <p:fade thruBlk="0"/>
       </p:transition>
     </mc:Fallback>
   </mc:AlternateContent>
@@ -14110,15 +14175,22 @@
 </file>
 
 <file path=ppt/slides/slide5.xml><?xml version="1.0" encoding="utf-8"?>
-<p:sld xmlns:a="http://schemas.openxmlformats.org/drawingml/2006/main" xmlns:r="http://schemas.openxmlformats.org/officeDocument/2006/relationships" xmlns:p="http://schemas.openxmlformats.org/presentationml/2006/main">
-  <p:cSld>
+<p:sld xmlns:a="http://schemas.openxmlformats.org/drawingml/2006/main" xmlns:r="http://schemas.openxmlformats.org/officeDocument/2006/relationships" xmlns:p="http://schemas.openxmlformats.org/presentationml/2006/main" xmlns:m="http://schemas.openxmlformats.org/officeDocument/2006/math" xmlns:w="http://schemas.openxmlformats.org/wordprocessingml/2006/main" showMasterPhAnim="0" show="1">
+  <p:cSld name="">
     <p:spTree>
       <p:nvGrpSpPr>
         <p:cNvPr id="1" name=""/>
         <p:cNvGrpSpPr/>
         <p:nvPr/>
       </p:nvGrpSpPr>
-      <p:grpSpPr/>
+      <p:grpSpPr bwMode="auto">
+        <a:xfrm>
+          <a:off x="0" y="0"/>
+          <a:ext cx="0" cy="0"/>
+          <a:chOff x="0" y="0"/>
+          <a:chExt cx="0" cy="0"/>
+        </a:xfrm>
+      </p:grpSpPr>
       <p:sp>
         <p:nvSpPr>
           <p:cNvPr id="2" name="Title 1"/>
@@ -14129,10 +14201,13 @@
             <p:ph type="title"/>
           </p:nvPr>
         </p:nvSpPr>
-        <p:spPr/>
+        <p:spPr bwMode="auto"/>
         <p:txBody>
           <a:bodyPr/>
           <a:p>
+            <a:pPr>
+              <a:defRPr/>
+            </a:pPr>
             <a:r>
               <a:rPr lang="en-US"/>
               <a:t>Motor Signal generation</a:t>
@@ -14152,12 +14227,10 @@
           </p:nvPr>
         </p:nvPicPr>
         <p:blipFill>
-          <a:blip r:embed="rId1"/>
-          <a:stretch>
-            <a:fillRect/>
-          </a:stretch>
+          <a:blip r:embed="rId2"/>
+          <a:stretch/>
         </p:blipFill>
-        <p:spPr>
+        <p:spPr bwMode="auto">
           <a:xfrm>
             <a:off x="1720850" y="2443480"/>
             <a:ext cx="8118475" cy="3074670"/>
@@ -14172,19 +14245,34 @@
   <p:clrMapOvr>
     <a:masterClrMapping/>
   </p:clrMapOvr>
+  <mc:AlternateContent xmlns:mc="http://schemas.openxmlformats.org/markup-compatibility/2006">
+    <mc:Choice xmlns:p14="http://schemas.microsoft.com/office/powerpoint/2010/main" Requires="p14">
+      <p:transition p14:dur="2000" advClick="1"/>
+    </mc:Choice>
+    <mc:Fallback>
+      <p:transition advClick="1"/>
+    </mc:Fallback>
+  </mc:AlternateContent>
 </p:sld>
 </file>
 
 <file path=ppt/slides/slide6.xml><?xml version="1.0" encoding="utf-8"?>
-<p:sld xmlns:a="http://schemas.openxmlformats.org/drawingml/2006/main" xmlns:r="http://schemas.openxmlformats.org/officeDocument/2006/relationships" xmlns:p="http://schemas.openxmlformats.org/presentationml/2006/main">
-  <p:cSld>
+<p:sld xmlns:a="http://schemas.openxmlformats.org/drawingml/2006/main" xmlns:r="http://schemas.openxmlformats.org/officeDocument/2006/relationships" xmlns:p="http://schemas.openxmlformats.org/presentationml/2006/main" xmlns:m="http://schemas.openxmlformats.org/officeDocument/2006/math" xmlns:w="http://schemas.openxmlformats.org/wordprocessingml/2006/main" showMasterPhAnim="0" show="1">
+  <p:cSld name="">
     <p:spTree>
       <p:nvGrpSpPr>
         <p:cNvPr id="1" name=""/>
         <p:cNvGrpSpPr/>
         <p:nvPr/>
       </p:nvGrpSpPr>
-      <p:grpSpPr/>
+      <p:grpSpPr bwMode="auto">
+        <a:xfrm>
+          <a:off x="0" y="0"/>
+          <a:ext cx="0" cy="0"/>
+          <a:chOff x="0" y="0"/>
+          <a:chExt cx="0" cy="0"/>
+        </a:xfrm>
+      </p:grpSpPr>
       <p:sp>
         <p:nvSpPr>
           <p:cNvPr id="2" name="Title 1"/>
@@ -14195,10 +14283,13 @@
             <p:ph type="title"/>
           </p:nvPr>
         </p:nvSpPr>
-        <p:spPr/>
+        <p:spPr bwMode="auto"/>
         <p:txBody>
           <a:bodyPr/>
           <a:p>
+            <a:pPr>
+              <a:defRPr/>
+            </a:pPr>
             <a:r>
               <a:rPr lang="en-US"/>
               <a:t>PID links</a:t>
@@ -14217,10 +14308,13 @@
             <p:ph idx="1"/>
           </p:nvPr>
         </p:nvSpPr>
-        <p:spPr/>
+        <p:spPr bwMode="auto"/>
         <p:txBody>
           <a:bodyPr/>
           <a:p>
+            <a:pPr>
+              <a:defRPr/>
+            </a:pPr>
             <a:r>
               <a:rPr lang="en-US"/>
               <a:t>Link to concept:</a:t>
@@ -14228,6 +14322,9 @@
             <a:endParaRPr lang="en-US"/>
           </a:p>
           <a:p>
+            <a:pPr>
+              <a:defRPr/>
+            </a:pPr>
             <a:r>
               <a:rPr lang="en-US"/>
               <a:t>https://www.youtube.com/watch?v=IlSaijwwmpQ</a:t>
@@ -14235,6 +14332,9 @@
             <a:endParaRPr lang="en-US"/>
           </a:p>
           <a:p>
+            <a:pPr>
+              <a:defRPr/>
+            </a:pPr>
             <a:r>
               <a:rPr lang="en-US"/>
               <a:t>https://www.youtube.com/watch?v=wkfEZmsQqiA highly recomended</a:t>
@@ -14242,9 +14342,15 @@
             <a:endParaRPr lang="en-US"/>
           </a:p>
           <a:p>
-            <a:endParaRPr lang="en-US"/>
-          </a:p>
-          <a:p>
+            <a:pPr>
+              <a:defRPr/>
+            </a:pPr>
+            <a:endParaRPr lang="en-US"/>
+          </a:p>
+          <a:p>
+            <a:pPr>
+              <a:defRPr/>
+            </a:pPr>
             <a:r>
               <a:rPr lang="en-US"/>
               <a:t>Unfortunately its not a very easy process.</a:t>
@@ -14258,12 +14364,20 @@
   <p:clrMapOvr>
     <a:masterClrMapping/>
   </p:clrMapOvr>
+  <mc:AlternateContent xmlns:mc="http://schemas.openxmlformats.org/markup-compatibility/2006">
+    <mc:Choice xmlns:p14="http://schemas.microsoft.com/office/powerpoint/2010/main" Requires="p14">
+      <p:transition p14:dur="2000" advClick="1"/>
+    </mc:Choice>
+    <mc:Fallback>
+      <p:transition advClick="1"/>
+    </mc:Fallback>
+  </mc:AlternateContent>
 </p:sld>
 </file>
 
 <file path=ppt/slides/slide7.xml><?xml version="1.0" encoding="utf-8"?>
-<p:sld xmlns:a="http://schemas.openxmlformats.org/drawingml/2006/main" xmlns:r="http://schemas.openxmlformats.org/officeDocument/2006/relationships" xmlns:p="http://schemas.openxmlformats.org/presentationml/2006/main" showMasterPhAnim="0">
-  <p:cSld>
+<p:sld xmlns:a="http://schemas.openxmlformats.org/drawingml/2006/main" xmlns:r="http://schemas.openxmlformats.org/officeDocument/2006/relationships" xmlns:p="http://schemas.openxmlformats.org/presentationml/2006/main" xmlns:m="http://schemas.openxmlformats.org/officeDocument/2006/math" xmlns:w="http://schemas.openxmlformats.org/wordprocessingml/2006/main" showMasterPhAnim="0" show="1">
+  <p:cSld name="">
     <p:spTree>
       <p:nvGrpSpPr>
         <p:cNvPr id="1" name=""/>
@@ -14329,6 +14443,7 @@
             <a:pPr>
               <a:defRPr/>
             </a:pPr>
+            <a:endParaRPr/>
           </a:p>
           <a:p>
             <a:pPr>
@@ -14352,18 +14467,18 @@
   </p:clrMapOvr>
   <mc:AlternateContent xmlns:mc="http://schemas.openxmlformats.org/markup-compatibility/2006">
     <mc:Choice xmlns:p14="http://schemas.microsoft.com/office/powerpoint/2010/main" Requires="p14">
-      <p:transition p14:dur="2000"/>
+      <p:transition p14:dur="2000" advClick="1"/>
     </mc:Choice>
     <mc:Fallback>
-      <p:transition/>
+      <p:transition advClick="1"/>
     </mc:Fallback>
   </mc:AlternateContent>
 </p:sld>
 </file>
 
 <file path=ppt/slides/slide8.xml><?xml version="1.0" encoding="utf-8"?>
-<p:sld xmlns:a="http://schemas.openxmlformats.org/drawingml/2006/main" xmlns:r="http://schemas.openxmlformats.org/officeDocument/2006/relationships" xmlns:p="http://schemas.openxmlformats.org/presentationml/2006/main" showMasterPhAnim="0">
-  <p:cSld>
+<p:sld xmlns:a="http://schemas.openxmlformats.org/drawingml/2006/main" xmlns:r="http://schemas.openxmlformats.org/officeDocument/2006/relationships" xmlns:p="http://schemas.openxmlformats.org/presentationml/2006/main" xmlns:m="http://schemas.openxmlformats.org/officeDocument/2006/math" xmlns:w="http://schemas.openxmlformats.org/wordprocessingml/2006/main" showMasterPhAnim="0" show="1">
+  <p:cSld name="">
     <p:spTree>
       <p:nvGrpSpPr>
         <p:cNvPr id="1" name=""/>
@@ -14428,13 +14543,16 @@
               <a:defRPr/>
             </a:pPr>
             <a:r>
+              <a:rPr/>
               <a:t>We’ll control the voltage directly from the analog output of the arduino controller to vary the speed.</a:t>
             </a:r>
+            <a:endParaRPr/>
           </a:p>
           <a:p>
             <a:pPr>
               <a:defRPr/>
             </a:pPr>
+            <a:endParaRPr/>
           </a:p>
         </p:txBody>
       </p:sp>
@@ -14445,18 +14563,18 @@
   </p:clrMapOvr>
   <mc:AlternateContent xmlns:mc="http://schemas.openxmlformats.org/markup-compatibility/2006">
     <mc:Choice xmlns:p14="http://schemas.microsoft.com/office/powerpoint/2010/main" Requires="p14">
-      <p:transition p14:dur="2000"/>
+      <p:transition p14:dur="2000" advClick="1"/>
     </mc:Choice>
     <mc:Fallback>
-      <p:transition/>
+      <p:transition advClick="1"/>
     </mc:Fallback>
   </mc:AlternateContent>
 </p:sld>
 </file>
 
 <file path=ppt/slides/slide9.xml><?xml version="1.0" encoding="utf-8"?>
-<p:sld xmlns:a="http://schemas.openxmlformats.org/drawingml/2006/main" xmlns:r="http://schemas.openxmlformats.org/officeDocument/2006/relationships" xmlns:p="http://schemas.openxmlformats.org/presentationml/2006/main" showMasterPhAnim="0">
-  <p:cSld>
+<p:sld xmlns:a="http://schemas.openxmlformats.org/drawingml/2006/main" xmlns:r="http://schemas.openxmlformats.org/officeDocument/2006/relationships" xmlns:p="http://schemas.openxmlformats.org/presentationml/2006/main" xmlns:m="http://schemas.openxmlformats.org/officeDocument/2006/math" xmlns:w="http://schemas.openxmlformats.org/wordprocessingml/2006/main" showMasterPhAnim="0" show="1">
+  <p:cSld name="">
     <p:spTree>
       <p:nvGrpSpPr>
         <p:cNvPr id="1" name=""/>
@@ -14490,8 +14608,10 @@
               <a:defRPr/>
             </a:pPr>
             <a:r>
+              <a:rPr/>
               <a:t>Challenges</a:t>
             </a:r>
+            <a:endParaRPr/>
           </a:p>
         </p:txBody>
       </p:sp>
@@ -14508,7 +14628,7 @@
         <p:spPr bwMode="auto">
           <a:xfrm>
             <a:off x="1154953" y="2603499"/>
-            <a:ext cx="8825658" cy="3416299"/>
+            <a:ext cx="8825658" cy="3416298"/>
           </a:xfrm>
         </p:spPr>
         <p:txBody>
@@ -14528,6 +14648,7 @@
             <a:pPr>
               <a:defRPr/>
             </a:pPr>
+            <a:endParaRPr/>
           </a:p>
         </p:txBody>
       </p:sp>
@@ -14538,17 +14659,17 @@
   </p:clrMapOvr>
   <mc:AlternateContent xmlns:mc="http://schemas.openxmlformats.org/markup-compatibility/2006">
     <mc:Choice xmlns:p14="http://schemas.microsoft.com/office/powerpoint/2010/main" Requires="p14">
-      <p:transition p14:dur="2000"/>
+      <p:transition p14:dur="2000" advClick="1"/>
     </mc:Choice>
     <mc:Fallback>
-      <p:transition/>
+      <p:transition advClick="1"/>
     </mc:Fallback>
   </mc:AlternateContent>
 </p:sld>
 </file>
 
 <file path=ppt/theme/theme1.xml><?xml version="1.0" encoding="utf-8"?>
-<a:theme xmlns:a="http://schemas.openxmlformats.org/drawingml/2006/main" name="Ion Boardroom">
+<a:theme xmlns:a="http://schemas.openxmlformats.org/drawingml/2006/main" xmlns:r="http://schemas.openxmlformats.org/officeDocument/2006/relationships" xmlns:p="http://schemas.openxmlformats.org/presentationml/2006/main" name="Ion Boardroom">
   <a:themeElements>
     <a:clrScheme name="Violet II">
       <a:dk1>
@@ -14716,7 +14837,7 @@
           <a:path path="circle"/>
         </a:gradFill>
         <a:blipFill>
-          <a:blip xmlns:r="http://schemas.openxmlformats.org/officeDocument/2006/relationships" r:embed="rId1">
+          <a:blip r:embed="rId1">
             <a:duotone>
               <a:schemeClr val="phClr">
                 <a:shade val="69000"/>
@@ -14731,17 +14852,11 @@
               </a:schemeClr>
             </a:duotone>
           </a:blip>
-          <a:stretch>
-            <a:fillRect/>
-          </a:stretch>
+          <a:stretch/>
         </a:blipFill>
       </a:bgFillStyleLst>
     </a:fmtScheme>
   </a:themeElements>
-  <a:extLst>
-    <a:ext uri="{05A4C25C-085E-4340-85A3-A5531E510DB2}">
-      <thm15:themeFamily xmlns:thm15="http://schemas.microsoft.com/office/thememl/2012/main" name="Office Theme" id="{62F939B6-93AF-4DB8-9C6B-D6C7DFDC589F}" vid="{4A3C46E8-61CC-4603-A589-7422A47A8E4A}"/>
-    </a:ext>
-  </a:extLst>
+  <a:objectDefaults/>
 </a:theme>
 </file>
</xml_diff>